<commit_message>
add instructions on how to use UNIX on Windows
</commit_message>
<xml_diff>
--- a/workshop.slides/day3_Unix.pptx
+++ b/workshop.slides/day3_Unix.pptx
@@ -5,7 +5,7 @@
     <p:sldMasterId id="2147483648" r:id="rId1"/>
   </p:sldMasterIdLst>
   <p:notesMasterIdLst>
-    <p:notesMasterId r:id="rId37"/>
+    <p:notesMasterId r:id="rId36"/>
   </p:notesMasterIdLst>
   <p:sldIdLst>
     <p:sldId id="256" r:id="rId2"/>
@@ -40,9 +40,8 @@
     <p:sldId id="366" r:id="rId31"/>
     <p:sldId id="367" r:id="rId32"/>
     <p:sldId id="380" r:id="rId33"/>
-    <p:sldId id="368" r:id="rId34"/>
-    <p:sldId id="381" r:id="rId35"/>
-    <p:sldId id="329" r:id="rId36"/>
+    <p:sldId id="381" r:id="rId34"/>
+    <p:sldId id="329" r:id="rId35"/>
   </p:sldIdLst>
   <p:sldSz cx="9144000" cy="6858000" type="screen4x3"/>
   <p:notesSz cx="6858000" cy="9144000"/>
@@ -4354,7 +4353,7 @@
           <a:p>
             <a:fld id="{70F679AF-909A-4245-86E7-698F41E2ACF1}" type="datetimeFigureOut">
               <a:rPr lang="en-US" smtClean="0"/>
-              <a:t>6/28/18</a:t>
+              <a:t>6/29/18</a:t>
             </a:fld>
             <a:endParaRPr lang="en-US"/>
           </a:p>
@@ -4685,6 +4684,90 @@
           <a:bodyPr/>
           <a:lstStyle/>
           <a:p>
+            <a:fld id="{4C7DAA83-9FAE-314B-8B27-545E02CA006B}" type="slidenum">
+              <a:rPr lang="en-US" smtClean="0"/>
+              <a:t>29</a:t>
+            </a:fld>
+            <a:endParaRPr lang="en-US"/>
+          </a:p>
+        </p:txBody>
+      </p:sp>
+    </p:spTree>
+    <p:extLst>
+      <p:ext uri="{BB962C8B-B14F-4D97-AF65-F5344CB8AC3E}">
+        <p14:creationId xmlns:p14="http://schemas.microsoft.com/office/powerpoint/2010/main" val="2137430169"/>
+      </p:ext>
+    </p:extLst>
+  </p:cSld>
+  <p:clrMapOvr>
+    <a:masterClrMapping/>
+  </p:clrMapOvr>
+</p:notes>
+</file>
+
+<file path=ppt/notesSlides/notesSlide2.xml><?xml version="1.0" encoding="utf-8"?>
+<p:notes xmlns:a="http://schemas.openxmlformats.org/drawingml/2006/main" xmlns:r="http://schemas.openxmlformats.org/officeDocument/2006/relationships" xmlns:p="http://schemas.openxmlformats.org/presentationml/2006/main">
+  <p:cSld>
+    <p:spTree>
+      <p:nvGrpSpPr>
+        <p:cNvPr id="1" name=""/>
+        <p:cNvGrpSpPr/>
+        <p:nvPr/>
+      </p:nvGrpSpPr>
+      <p:grpSpPr>
+        <a:xfrm>
+          <a:off x="0" y="0"/>
+          <a:ext cx="0" cy="0"/>
+          <a:chOff x="0" y="0"/>
+          <a:chExt cx="0" cy="0"/>
+        </a:xfrm>
+      </p:grpSpPr>
+      <p:sp>
+        <p:nvSpPr>
+          <p:cNvPr id="2" name="Slide Image Placeholder 1"/>
+          <p:cNvSpPr>
+            <a:spLocks noGrp="1" noRot="1" noChangeAspect="1"/>
+          </p:cNvSpPr>
+          <p:nvPr>
+            <p:ph type="sldImg"/>
+          </p:nvPr>
+        </p:nvSpPr>
+        <p:spPr/>
+      </p:sp>
+      <p:sp>
+        <p:nvSpPr>
+          <p:cNvPr id="3" name="Notes Placeholder 2"/>
+          <p:cNvSpPr>
+            <a:spLocks noGrp="1"/>
+          </p:cNvSpPr>
+          <p:nvPr>
+            <p:ph type="body" idx="1"/>
+          </p:nvPr>
+        </p:nvSpPr>
+        <p:spPr/>
+        <p:txBody>
+          <a:bodyPr/>
+          <a:lstStyle/>
+          <a:p>
+            <a:endParaRPr lang="en-US" dirty="0"/>
+          </a:p>
+        </p:txBody>
+      </p:sp>
+      <p:sp>
+        <p:nvSpPr>
+          <p:cNvPr id="4" name="Slide Number Placeholder 3"/>
+          <p:cNvSpPr>
+            <a:spLocks noGrp="1"/>
+          </p:cNvSpPr>
+          <p:nvPr>
+            <p:ph type="sldNum" sz="quarter" idx="10"/>
+          </p:nvPr>
+        </p:nvSpPr>
+        <p:spPr/>
+        <p:txBody>
+          <a:bodyPr/>
+          <a:lstStyle/>
+          <a:p>
             <a:fld id="{B3F07222-BA9A-8347-A754-6FFFE53DC13F}" type="slidenum">
               <a:rPr lang="en-US" smtClean="0"/>
               <a:t>32</a:t>
@@ -4887,7 +4970,7 @@
           <a:p>
             <a:fld id="{5156F65C-B851-CC4D-9273-9AD4DD6B8802}" type="datetimeFigureOut">
               <a:rPr lang="en-US" smtClean="0"/>
-              <a:t>6/28/18</a:t>
+              <a:t>6/29/18</a:t>
             </a:fld>
             <a:endParaRPr lang="en-US"/>
           </a:p>
@@ -5057,7 +5140,7 @@
           <a:p>
             <a:fld id="{5156F65C-B851-CC4D-9273-9AD4DD6B8802}" type="datetimeFigureOut">
               <a:rPr lang="en-US" smtClean="0"/>
-              <a:t>6/28/18</a:t>
+              <a:t>6/29/18</a:t>
             </a:fld>
             <a:endParaRPr lang="en-US"/>
           </a:p>
@@ -5237,7 +5320,7 @@
           <a:p>
             <a:fld id="{5156F65C-B851-CC4D-9273-9AD4DD6B8802}" type="datetimeFigureOut">
               <a:rPr lang="en-US" smtClean="0"/>
-              <a:t>6/28/18</a:t>
+              <a:t>6/29/18</a:t>
             </a:fld>
             <a:endParaRPr lang="en-US"/>
           </a:p>
@@ -5407,7 +5490,7 @@
           <a:p>
             <a:fld id="{5156F65C-B851-CC4D-9273-9AD4DD6B8802}" type="datetimeFigureOut">
               <a:rPr lang="en-US" smtClean="0"/>
-              <a:t>6/28/18</a:t>
+              <a:t>6/29/18</a:t>
             </a:fld>
             <a:endParaRPr lang="en-US"/>
           </a:p>
@@ -5653,7 +5736,7 @@
           <a:p>
             <a:fld id="{5156F65C-B851-CC4D-9273-9AD4DD6B8802}" type="datetimeFigureOut">
               <a:rPr lang="en-US" smtClean="0"/>
-              <a:t>6/28/18</a:t>
+              <a:t>6/29/18</a:t>
             </a:fld>
             <a:endParaRPr lang="en-US"/>
           </a:p>
@@ -5941,7 +6024,7 @@
           <a:p>
             <a:fld id="{5156F65C-B851-CC4D-9273-9AD4DD6B8802}" type="datetimeFigureOut">
               <a:rPr lang="en-US" smtClean="0"/>
-              <a:t>6/28/18</a:t>
+              <a:t>6/29/18</a:t>
             </a:fld>
             <a:endParaRPr lang="en-US"/>
           </a:p>
@@ -6363,7 +6446,7 @@
           <a:p>
             <a:fld id="{5156F65C-B851-CC4D-9273-9AD4DD6B8802}" type="datetimeFigureOut">
               <a:rPr lang="en-US" smtClean="0"/>
-              <a:t>6/28/18</a:t>
+              <a:t>6/29/18</a:t>
             </a:fld>
             <a:endParaRPr lang="en-US"/>
           </a:p>
@@ -6481,7 +6564,7 @@
           <a:p>
             <a:fld id="{5156F65C-B851-CC4D-9273-9AD4DD6B8802}" type="datetimeFigureOut">
               <a:rPr lang="en-US" smtClean="0"/>
-              <a:t>6/28/18</a:t>
+              <a:t>6/29/18</a:t>
             </a:fld>
             <a:endParaRPr lang="en-US"/>
           </a:p>
@@ -6576,7 +6659,7 @@
           <a:p>
             <a:fld id="{5156F65C-B851-CC4D-9273-9AD4DD6B8802}" type="datetimeFigureOut">
               <a:rPr lang="en-US" smtClean="0"/>
-              <a:t>6/28/18</a:t>
+              <a:t>6/29/18</a:t>
             </a:fld>
             <a:endParaRPr lang="en-US"/>
           </a:p>
@@ -6853,7 +6936,7 @@
           <a:p>
             <a:fld id="{5156F65C-B851-CC4D-9273-9AD4DD6B8802}" type="datetimeFigureOut">
               <a:rPr lang="en-US" smtClean="0"/>
-              <a:t>6/28/18</a:t>
+              <a:t>6/29/18</a:t>
             </a:fld>
             <a:endParaRPr lang="en-US"/>
           </a:p>
@@ -7106,7 +7189,7 @@
           <a:p>
             <a:fld id="{5156F65C-B851-CC4D-9273-9AD4DD6B8802}" type="datetimeFigureOut">
               <a:rPr lang="en-US" smtClean="0"/>
-              <a:t>6/28/18</a:t>
+              <a:t>6/29/18</a:t>
             </a:fld>
             <a:endParaRPr lang="en-US"/>
           </a:p>
@@ -7319,7 +7402,7 @@
           <a:p>
             <a:fld id="{5156F65C-B851-CC4D-9273-9AD4DD6B8802}" type="datetimeFigureOut">
               <a:rPr lang="en-US" smtClean="0"/>
-              <a:t>6/28/18</a:t>
+              <a:t>6/29/18</a:t>
             </a:fld>
             <a:endParaRPr lang="en-US"/>
           </a:p>
@@ -10773,14 +10856,7 @@
                 <a:latin typeface="Courier New"/>
                 <a:cs typeface="Courier New"/>
               </a:rPr>
-              <a:t>sum/3000</a:t>
-            </a:r>
-            <a:r>
-              <a:rPr lang="en-US" sz="2000" dirty="0" smtClean="0">
-                <a:latin typeface="Courier New"/>
-                <a:cs typeface="Courier New"/>
-              </a:rPr>
-              <a:t>}</a:t>
+              <a:t>sum/3000}</a:t>
             </a:r>
             <a:r>
               <a:rPr lang="en-US" sz="2000" dirty="0">
@@ -13953,10 +14029,15 @@
             <p:ph idx="1"/>
           </p:nvPr>
         </p:nvSpPr>
-        <p:spPr/>
+        <p:spPr>
+          <a:xfrm>
+            <a:off x="457200" y="2120900"/>
+            <a:ext cx="8229600" cy="4525963"/>
+          </a:xfrm>
+        </p:spPr>
         <p:txBody>
           <a:bodyPr>
-            <a:normAutofit fontScale="77500" lnSpcReduction="20000"/>
+            <a:normAutofit/>
           </a:bodyPr>
           <a:lstStyle/>
           <a:p>
@@ -13964,18 +14045,41 @@
               <a:buNone/>
             </a:pPr>
             <a:r>
-              <a:rPr lang="en-US" dirty="0">
-                <a:latin typeface="Courier New"/>
-                <a:cs typeface="Courier New"/>
-              </a:rPr>
-              <a:t>#!/bin/bash</a:t>
-            </a:r>
+              <a:rPr lang="en-US" sz="2000" dirty="0">
+                <a:latin typeface="Courier New"/>
+                <a:cs typeface="Courier New"/>
+              </a:rPr>
+              <a:t>#!/</a:t>
+            </a:r>
+            <a:r>
+              <a:rPr lang="en-US" sz="2000" dirty="0" smtClean="0">
+                <a:latin typeface="Courier New"/>
+                <a:cs typeface="Courier New"/>
+              </a:rPr>
+              <a:t>bin/bash</a:t>
+            </a:r>
+            <a:endParaRPr lang="en-US" sz="2000" dirty="0">
+              <a:latin typeface="Courier New"/>
+              <a:cs typeface="Courier New"/>
+            </a:endParaRPr>
           </a:p>
           <a:p>
             <a:pPr marL="0" indent="0">
               <a:buNone/>
             </a:pPr>
-            <a:endParaRPr lang="en-US" dirty="0">
+            <a:r>
+              <a:rPr lang="en-US" sz="2000" dirty="0">
+                <a:latin typeface="Courier New"/>
+                <a:cs typeface="Courier New"/>
+              </a:rPr>
+              <a:t>echo "My first script"</a:t>
+            </a:r>
+          </a:p>
+          <a:p>
+            <a:pPr marL="0" indent="0">
+              <a:buNone/>
+            </a:pPr>
+            <a:endParaRPr lang="en-US" sz="2000" dirty="0">
               <a:latin typeface="Courier New"/>
               <a:cs typeface="Courier New"/>
             </a:endParaRPr>
@@ -13985,18 +14089,72 @@
               <a:buNone/>
             </a:pPr>
             <a:r>
-              <a:rPr lang="en-US" dirty="0">
-                <a:latin typeface="Courier New"/>
-                <a:cs typeface="Courier New"/>
-              </a:rPr>
-              <a:t>echo "My first script"</a:t>
+              <a:rPr lang="en-US" sz="2000" dirty="0" err="1" smtClean="0">
+                <a:latin typeface="Courier New"/>
+                <a:cs typeface="Courier New"/>
+              </a:rPr>
+              <a:t>mkdir</a:t>
+            </a:r>
+            <a:r>
+              <a:rPr lang="en-US" sz="2000" dirty="0" smtClean="0">
+                <a:latin typeface="Courier New"/>
+                <a:cs typeface="Courier New"/>
+              </a:rPr>
+              <a:t> </a:t>
+            </a:r>
+            <a:r>
+              <a:rPr lang="en-US" sz="2000" dirty="0">
+                <a:latin typeface="Courier New"/>
+                <a:cs typeface="Courier New"/>
+              </a:rPr>
+              <a:t>chr2_gtf</a:t>
             </a:r>
           </a:p>
           <a:p>
             <a:pPr marL="0" indent="0">
               <a:buNone/>
             </a:pPr>
-            <a:endParaRPr lang="en-US" dirty="0">
+            <a:r>
+              <a:rPr lang="en-US" sz="2000" dirty="0" err="1">
+                <a:latin typeface="Courier New"/>
+                <a:cs typeface="Courier New"/>
+              </a:rPr>
+              <a:t>mkdir</a:t>
+            </a:r>
+            <a:r>
+              <a:rPr lang="en-US" sz="2000" dirty="0">
+                <a:latin typeface="Courier New"/>
+                <a:cs typeface="Courier New"/>
+              </a:rPr>
+              <a:t> chr3_gtf</a:t>
+            </a:r>
+          </a:p>
+          <a:p>
+            <a:pPr marL="0" indent="0">
+              <a:buNone/>
+            </a:pPr>
+            <a:r>
+              <a:rPr lang="en-US" sz="2000" dirty="0" err="1">
+                <a:latin typeface="Courier New"/>
+                <a:cs typeface="Courier New"/>
+              </a:rPr>
+              <a:t>mkdir</a:t>
+            </a:r>
+            <a:r>
+              <a:rPr lang="en-US" sz="2000" dirty="0">
+                <a:latin typeface="Courier New"/>
+                <a:cs typeface="Courier New"/>
+              </a:rPr>
+              <a:t> </a:t>
+            </a:r>
+            <a:r>
+              <a:rPr lang="en-US" sz="2000" dirty="0" smtClean="0">
+                <a:latin typeface="Courier New"/>
+                <a:cs typeface="Courier New"/>
+              </a:rPr>
+              <a:t>chr21_gtf</a:t>
+            </a:r>
+            <a:endParaRPr lang="en-US" sz="2000" dirty="0">
               <a:latin typeface="Courier New"/>
               <a:cs typeface="Courier New"/>
             </a:endParaRPr>
@@ -14005,45 +14163,42 @@
             <a:pPr marL="0" indent="0">
               <a:buNone/>
             </a:pPr>
-            <a:r>
-              <a:rPr lang="en-US" dirty="0" err="1" smtClean="0">
-                <a:latin typeface="Courier New"/>
-                <a:cs typeface="Courier New"/>
-              </a:rPr>
-              <a:t>mkdir</a:t>
-            </a:r>
-            <a:r>
-              <a:rPr lang="en-US" dirty="0" smtClean="0">
-                <a:latin typeface="Courier New"/>
-                <a:cs typeface="Courier New"/>
-              </a:rPr>
-              <a:t> </a:t>
-            </a:r>
-            <a:r>
-              <a:rPr lang="en-US" dirty="0">
-                <a:latin typeface="Courier New"/>
-                <a:cs typeface="Courier New"/>
-              </a:rPr>
-              <a:t>chr2_gtf</a:t>
-            </a:r>
+            <a:endParaRPr lang="en-US" sz="2000" dirty="0">
+              <a:latin typeface="Courier New"/>
+              <a:cs typeface="Courier New"/>
+            </a:endParaRPr>
           </a:p>
           <a:p>
             <a:pPr marL="0" indent="0">
               <a:buNone/>
             </a:pPr>
             <a:r>
-              <a:rPr lang="en-US" dirty="0" err="1">
-                <a:latin typeface="Courier New"/>
-                <a:cs typeface="Courier New"/>
-              </a:rPr>
-              <a:t>mkdir</a:t>
-            </a:r>
-            <a:r>
-              <a:rPr lang="en-US" dirty="0">
-                <a:latin typeface="Courier New"/>
-                <a:cs typeface="Courier New"/>
-              </a:rPr>
-              <a:t> chr3_gtf</a:t>
+              <a:rPr lang="en-US" sz="2000" dirty="0" err="1">
+                <a:latin typeface="Courier New"/>
+                <a:cs typeface="Courier New"/>
+              </a:rPr>
+              <a:t>grep</a:t>
+            </a:r>
+            <a:r>
+              <a:rPr lang="en-US" sz="2000" dirty="0">
+                <a:latin typeface="Courier New"/>
+                <a:cs typeface="Courier New"/>
+              </a:rPr>
+              <a:t> "chr2\s" $1 </a:t>
+            </a:r>
+            <a:r>
+              <a:rPr lang="en-US" sz="2000" dirty="0" smtClean="0">
+                <a:latin typeface="Courier New"/>
+                <a:cs typeface="Courier New"/>
+              </a:rPr>
+              <a:t>&gt;chr2_gtf</a:t>
+            </a:r>
+            <a:r>
+              <a:rPr lang="en-US" sz="2000" dirty="0">
+                <a:latin typeface="Courier New"/>
+                <a:cs typeface="Courier New"/>
+              </a:rPr>
+              <a:t>/chr2.gtf</a:t>
             </a:r>
           </a:p>
           <a:p>
@@ -14051,133 +14206,61 @@
               <a:buNone/>
             </a:pPr>
             <a:r>
-              <a:rPr lang="en-US" dirty="0" err="1">
-                <a:latin typeface="Courier New"/>
-                <a:cs typeface="Courier New"/>
-              </a:rPr>
-              <a:t>mkdir</a:t>
-            </a:r>
-            <a:r>
-              <a:rPr lang="en-US" dirty="0">
-                <a:latin typeface="Courier New"/>
-                <a:cs typeface="Courier New"/>
-              </a:rPr>
-              <a:t> </a:t>
-            </a:r>
-            <a:r>
-              <a:rPr lang="en-US" dirty="0" smtClean="0">
-                <a:latin typeface="Courier New"/>
-                <a:cs typeface="Courier New"/>
-              </a:rPr>
-              <a:t>chr21_gtf</a:t>
-            </a:r>
-            <a:endParaRPr lang="en-US" dirty="0">
-              <a:latin typeface="Courier New"/>
-              <a:cs typeface="Courier New"/>
-            </a:endParaRPr>
+              <a:rPr lang="en-US" sz="2000" dirty="0" err="1">
+                <a:latin typeface="Courier New"/>
+                <a:cs typeface="Courier New"/>
+              </a:rPr>
+              <a:t>grep</a:t>
+            </a:r>
+            <a:r>
+              <a:rPr lang="en-US" sz="2000" dirty="0">
+                <a:latin typeface="Courier New"/>
+                <a:cs typeface="Courier New"/>
+              </a:rPr>
+              <a:t> "chr3\s" $1 </a:t>
+            </a:r>
+            <a:r>
+              <a:rPr lang="en-US" sz="2000" dirty="0" smtClean="0">
+                <a:latin typeface="Courier New"/>
+                <a:cs typeface="Courier New"/>
+              </a:rPr>
+              <a:t>&gt;chr3_gtf</a:t>
+            </a:r>
+            <a:r>
+              <a:rPr lang="en-US" sz="2000" dirty="0">
+                <a:latin typeface="Courier New"/>
+                <a:cs typeface="Courier New"/>
+              </a:rPr>
+              <a:t>/chr3.gtf</a:t>
+            </a:r>
           </a:p>
           <a:p>
             <a:pPr marL="0" indent="0">
               <a:buNone/>
             </a:pPr>
-            <a:endParaRPr lang="en-US" dirty="0">
-              <a:latin typeface="Courier New"/>
-              <a:cs typeface="Courier New"/>
-            </a:endParaRPr>
-          </a:p>
-          <a:p>
-            <a:pPr marL="0" indent="0">
-              <a:buNone/>
-            </a:pPr>
-            <a:r>
-              <a:rPr lang="en-US" dirty="0" err="1">
+            <a:r>
+              <a:rPr lang="en-US" sz="2000" dirty="0" err="1">
                 <a:latin typeface="Courier New"/>
                 <a:cs typeface="Courier New"/>
               </a:rPr>
               <a:t>grep</a:t>
             </a:r>
             <a:r>
-              <a:rPr lang="en-US" dirty="0">
-                <a:latin typeface="Courier New"/>
-                <a:cs typeface="Courier New"/>
-              </a:rPr>
-              <a:t> "chr2\s" $1 </a:t>
-            </a:r>
-            <a:r>
-              <a:rPr lang="en-US" dirty="0" smtClean="0">
-                <a:latin typeface="Courier New"/>
-                <a:cs typeface="Courier New"/>
-              </a:rPr>
-              <a:t>&gt;chr2_gtf</a:t>
-            </a:r>
-            <a:r>
-              <a:rPr lang="en-US" dirty="0">
-                <a:latin typeface="Courier New"/>
-                <a:cs typeface="Courier New"/>
-              </a:rPr>
-              <a:t>/chr2.gtf</a:t>
-            </a:r>
-          </a:p>
-          <a:p>
-            <a:pPr marL="0" indent="0">
-              <a:buNone/>
-            </a:pPr>
-            <a:r>
-              <a:rPr lang="en-US" dirty="0" err="1">
-                <a:latin typeface="Courier New"/>
-                <a:cs typeface="Courier New"/>
-              </a:rPr>
-              <a:t>grep</a:t>
-            </a:r>
-            <a:r>
-              <a:rPr lang="en-US" dirty="0">
-                <a:latin typeface="Courier New"/>
-                <a:cs typeface="Courier New"/>
-              </a:rPr>
-              <a:t> "chr3\s" $1 </a:t>
-            </a:r>
-            <a:r>
-              <a:rPr lang="en-US" dirty="0" smtClean="0">
-                <a:latin typeface="Courier New"/>
-                <a:cs typeface="Courier New"/>
-              </a:rPr>
-              <a:t>&gt;chr3_gtf</a:t>
-            </a:r>
-            <a:r>
-              <a:rPr lang="en-US" dirty="0">
-                <a:latin typeface="Courier New"/>
-                <a:cs typeface="Courier New"/>
-              </a:rPr>
-              <a:t>/chr3.gtf</a:t>
-            </a:r>
-          </a:p>
-          <a:p>
-            <a:pPr marL="0" indent="0">
-              <a:buNone/>
-            </a:pPr>
-            <a:r>
-              <a:rPr lang="en-US" dirty="0" err="1">
-                <a:latin typeface="Courier New"/>
-                <a:cs typeface="Courier New"/>
-              </a:rPr>
-              <a:t>grep</a:t>
-            </a:r>
-            <a:r>
-              <a:rPr lang="en-US" dirty="0">
+              <a:rPr lang="en-US" sz="2000" dirty="0">
                 <a:latin typeface="Courier New"/>
                 <a:cs typeface="Courier New"/>
               </a:rPr>
               <a:t> "chr21\s" $1 </a:t>
             </a:r>
             <a:r>
-              <a:rPr lang="en-US" dirty="0" smtClean="0">
+              <a:rPr lang="en-US" sz="2000" dirty="0" smtClean="0">
                 <a:latin typeface="Courier New"/>
                 <a:cs typeface="Courier New"/>
               </a:rPr>
               <a:t>&gt;chr21_gtf</a:t>
             </a:r>
             <a:r>
-              <a:rPr lang="en-US" dirty="0">
+              <a:rPr lang="en-US" sz="2000" dirty="0">
                 <a:latin typeface="Courier New"/>
                 <a:cs typeface="Courier New"/>
               </a:rPr>
@@ -14490,7 +14573,7 @@
         </p:blipFill>
         <p:spPr>
           <a:xfrm>
-            <a:off x="6954420" y="1287790"/>
+            <a:off x="6954420" y="1148090"/>
             <a:ext cx="609600" cy="715617"/>
           </a:xfrm>
           <a:prstGeom prst="rect">
@@ -14556,6 +14639,45 @@
               <a:t>How to run the script :</a:t>
             </a:r>
             <a:endParaRPr lang="en-US" dirty="0"/>
+          </a:p>
+        </p:txBody>
+      </p:sp>
+      <p:sp>
+        <p:nvSpPr>
+          <p:cNvPr id="14" name="Rectangle 13"/>
+          <p:cNvSpPr/>
+          <p:nvPr/>
+        </p:nvSpPr>
+        <p:spPr>
+          <a:xfrm>
+            <a:off x="242942" y="1954797"/>
+            <a:ext cx="7631057" cy="3942063"/>
+          </a:xfrm>
+          <a:prstGeom prst="rect">
+            <a:avLst/>
+          </a:prstGeom>
+          <a:noFill/>
+        </p:spPr>
+        <p:style>
+          <a:lnRef idx="1">
+            <a:schemeClr val="dk1"/>
+          </a:lnRef>
+          <a:fillRef idx="3">
+            <a:schemeClr val="dk1"/>
+          </a:fillRef>
+          <a:effectRef idx="2">
+            <a:schemeClr val="dk1"/>
+          </a:effectRef>
+          <a:fontRef idx="minor">
+            <a:schemeClr val="lt1"/>
+          </a:fontRef>
+        </p:style>
+        <p:txBody>
+          <a:bodyPr rtlCol="0" anchor="ctr"/>
+          <a:lstStyle/>
+          <a:p>
+            <a:pPr algn="ctr"/>
+            <a:endParaRPr lang="en-US" sz="1600"/>
           </a:p>
         </p:txBody>
       </p:sp>
@@ -15139,11 +15261,11 @@
               <a:t>[serghei@login1 test]$ </a:t>
             </a:r>
             <a:r>
-              <a:rPr lang="en-US" sz="2400" dirty="0" err="1">
-                <a:latin typeface="Courier New"/>
-                <a:cs typeface="Courier New"/>
-              </a:rPr>
-              <a:t>tophat</a:t>
+              <a:rPr lang="en-US" sz="2400" dirty="0" err="1" smtClean="0">
+                <a:latin typeface="Courier New"/>
+                <a:cs typeface="Courier New"/>
+              </a:rPr>
+              <a:t>bwa</a:t>
             </a:r>
             <a:endParaRPr lang="en-US" sz="2400" dirty="0">
               <a:latin typeface="Courier New"/>
@@ -15182,11 +15304,11 @@
               <a:t>[serghei@login1 test]$ module load </a:t>
             </a:r>
             <a:r>
-              <a:rPr lang="en-US" sz="2400" dirty="0" err="1">
-                <a:latin typeface="Courier New"/>
-                <a:cs typeface="Courier New"/>
-              </a:rPr>
-              <a:t>tophat</a:t>
+              <a:rPr lang="en-US" sz="2400" dirty="0" err="1" smtClean="0">
+                <a:latin typeface="Courier New"/>
+                <a:cs typeface="Courier New"/>
+              </a:rPr>
+              <a:t>bwa</a:t>
             </a:r>
             <a:endParaRPr lang="en-US" sz="2400" dirty="0">
               <a:latin typeface="Courier New"/>
@@ -15202,11 +15324,11 @@
               <a:t>[serghei@login1 test]$ </a:t>
             </a:r>
             <a:r>
-              <a:rPr lang="en-US" sz="2400" dirty="0" err="1">
-                <a:latin typeface="Courier New"/>
-                <a:cs typeface="Courier New"/>
-              </a:rPr>
-              <a:t>tophat</a:t>
+              <a:rPr lang="en-US" sz="2400" dirty="0" err="1" smtClean="0">
+                <a:latin typeface="Courier New"/>
+                <a:cs typeface="Courier New"/>
+              </a:rPr>
+              <a:t>bwa</a:t>
             </a:r>
             <a:endParaRPr lang="en-US" sz="2400" dirty="0">
               <a:latin typeface="Courier New"/>
@@ -15679,8 +15801,8 @@
         </p:nvSpPr>
         <p:spPr>
           <a:xfrm>
-            <a:off x="6163733" y="5537200"/>
-            <a:ext cx="2040680" cy="369332"/>
+            <a:off x="4753927" y="5321525"/>
+            <a:ext cx="3778791" cy="369332"/>
           </a:xfrm>
           <a:prstGeom prst="rect">
             <a:avLst/>
@@ -15699,7 +15821,11 @@
             </a:r>
             <a:r>
               <a:rPr lang="en-US" dirty="0" smtClean="0"/>
-              <a:t>ommand to be run</a:t>
+              <a:t>ommand </a:t>
+            </a:r>
+            <a:r>
+              <a:rPr lang="en-US" dirty="0" smtClean="0"/>
+              <a:t>to run (e.g. map NGS reads)</a:t>
             </a:r>
             <a:endParaRPr lang="en-US" dirty="0"/>
           </a:p>
@@ -15824,11 +15950,18 @@
               <a:t> -V –N </a:t>
             </a:r>
             <a:r>
+              <a:rPr lang="en-US" sz="1800" b="1" dirty="0" err="1" smtClean="0">
+                <a:latin typeface="Courier New"/>
+                <a:cs typeface="Courier New"/>
+              </a:rPr>
+              <a:t>testBWA</a:t>
+            </a:r>
+            <a:r>
               <a:rPr lang="en-US" sz="1800" b="1" dirty="0" smtClean="0">
                 <a:latin typeface="Courier New"/>
                 <a:cs typeface="Courier New"/>
               </a:rPr>
-              <a:t>test </a:t>
+              <a:t> </a:t>
             </a:r>
             <a:r>
               <a:rPr lang="en-US" sz="1800" dirty="0" smtClean="0">
@@ -15856,7 +15989,7 @@
                 <a:latin typeface="Courier New"/>
                 <a:cs typeface="Courier New"/>
               </a:rPr>
-              <a:t>1</a:t>
+              <a:t>8</a:t>
             </a:r>
             <a:r>
               <a:rPr lang="en-US" sz="1800" b="1" dirty="0" smtClean="0">
@@ -15866,39 +15999,18 @@
               <a:t>G</a:t>
             </a:r>
             <a:r>
-              <a:rPr lang="en-US" sz="1800" dirty="0">
-                <a:latin typeface="Courier New"/>
-                <a:cs typeface="Courier New"/>
-              </a:rPr>
-              <a:t>,time</a:t>
-            </a:r>
-            <a:r>
               <a:rPr lang="en-US" sz="1800" dirty="0" smtClean="0">
                 <a:latin typeface="Courier New"/>
                 <a:cs typeface="Courier New"/>
               </a:rPr>
-              <a:t>=</a:t>
-            </a:r>
-            <a:r>
-              <a:rPr lang="en-US" sz="1800" b="1" dirty="0">
-                <a:latin typeface="Courier New"/>
-                <a:cs typeface="Courier New"/>
-              </a:rPr>
-              <a:t>1</a:t>
+              <a:t>,time=</a:t>
             </a:r>
             <a:r>
               <a:rPr lang="en-US" sz="1800" b="1" dirty="0" smtClean="0">
                 <a:latin typeface="Courier New"/>
                 <a:cs typeface="Courier New"/>
               </a:rPr>
-              <a:t>:</a:t>
-            </a:r>
-            <a:r>
-              <a:rPr lang="en-US" sz="1800" b="1" dirty="0">
-                <a:latin typeface="Courier New"/>
-                <a:cs typeface="Courier New"/>
-              </a:rPr>
-              <a:t>00:00 </a:t>
+              <a:t>1:00:00 </a:t>
             </a:r>
             <a:r>
               <a:rPr lang="en-US" sz="1800" b="1" dirty="0" err="1" smtClean="0">
@@ -15961,148 +16073,6 @@
           </a:p>
         </p:txBody>
       </p:sp>
-      <p:sp>
-        <p:nvSpPr>
-          <p:cNvPr id="4" name="Rectangle 3"/>
-          <p:cNvSpPr/>
-          <p:nvPr/>
-        </p:nvSpPr>
-        <p:spPr>
-          <a:xfrm>
-            <a:off x="5836340" y="1600200"/>
-            <a:ext cx="2955106" cy="646331"/>
-          </a:xfrm>
-          <a:prstGeom prst="rect">
-            <a:avLst/>
-          </a:prstGeom>
-        </p:spPr>
-        <p:txBody>
-          <a:bodyPr wrap="none">
-            <a:spAutoFit/>
-          </a:bodyPr>
-          <a:lstStyle/>
-          <a:p>
-            <a:r>
-              <a:rPr lang="en-US" dirty="0">
-                <a:latin typeface="Courier New"/>
-                <a:cs typeface="Courier New"/>
-              </a:rPr>
-              <a:t>echo </a:t>
-            </a:r>
-            <a:r>
-              <a:rPr lang="en-US" dirty="0" smtClean="0">
-                <a:latin typeface="Courier New"/>
-                <a:cs typeface="Courier New"/>
-              </a:rPr>
-              <a:t>“My first </a:t>
-            </a:r>
-            <a:r>
-              <a:rPr lang="en-US" dirty="0" err="1" smtClean="0">
-                <a:latin typeface="Courier New"/>
-                <a:cs typeface="Courier New"/>
-              </a:rPr>
-              <a:t>qsub</a:t>
-            </a:r>
-            <a:r>
-              <a:rPr lang="en-US" dirty="0" smtClean="0">
-                <a:latin typeface="Courier New"/>
-                <a:cs typeface="Courier New"/>
-              </a:rPr>
-              <a:t>”</a:t>
-            </a:r>
-          </a:p>
-          <a:p>
-            <a:r>
-              <a:rPr lang="en-US" dirty="0">
-                <a:latin typeface="Courier New"/>
-                <a:cs typeface="Courier New"/>
-              </a:rPr>
-              <a:t>s</a:t>
-            </a:r>
-            <a:r>
-              <a:rPr lang="en-US" dirty="0" smtClean="0">
-                <a:latin typeface="Courier New"/>
-                <a:cs typeface="Courier New"/>
-              </a:rPr>
-              <a:t>leep 36000</a:t>
-            </a:r>
-            <a:endParaRPr lang="en-US" dirty="0">
-              <a:latin typeface="Courier New"/>
-              <a:cs typeface="Courier New"/>
-            </a:endParaRPr>
-          </a:p>
-        </p:txBody>
-      </p:sp>
-      <p:sp>
-        <p:nvSpPr>
-          <p:cNvPr id="5" name="Rectangle 4"/>
-          <p:cNvSpPr/>
-          <p:nvPr/>
-        </p:nvSpPr>
-        <p:spPr>
-          <a:xfrm>
-            <a:off x="5040474" y="2495034"/>
-            <a:ext cx="1425390" cy="369332"/>
-          </a:xfrm>
-          <a:prstGeom prst="rect">
-            <a:avLst/>
-          </a:prstGeom>
-        </p:spPr>
-        <p:txBody>
-          <a:bodyPr wrap="none">
-            <a:spAutoFit/>
-          </a:bodyPr>
-          <a:lstStyle/>
-          <a:p>
-            <a:r>
-              <a:rPr lang="en-US" dirty="0">
-                <a:latin typeface="Courier New"/>
-                <a:cs typeface="Courier New"/>
-              </a:rPr>
-              <a:t>v</a:t>
-            </a:r>
-            <a:r>
-              <a:rPr lang="en-US" dirty="0" smtClean="0">
-                <a:latin typeface="Courier New"/>
-                <a:cs typeface="Courier New"/>
-              </a:rPr>
-              <a:t>i </a:t>
-            </a:r>
-            <a:r>
-              <a:rPr lang="en-US" dirty="0" err="1" smtClean="0">
-                <a:latin typeface="Courier New"/>
-                <a:cs typeface="Courier New"/>
-              </a:rPr>
-              <a:t>run.sh</a:t>
-            </a:r>
-            <a:endParaRPr lang="en-US" dirty="0"/>
-          </a:p>
-        </p:txBody>
-      </p:sp>
-      <p:pic>
-        <p:nvPicPr>
-          <p:cNvPr id="6" name="Picture 5"/>
-          <p:cNvPicPr>
-            <a:picLocks noChangeAspect="1"/>
-          </p:cNvPicPr>
-          <p:nvPr/>
-        </p:nvPicPr>
-        <p:blipFill>
-          <a:blip r:embed="rId2"/>
-          <a:stretch>
-            <a:fillRect/>
-          </a:stretch>
-        </p:blipFill>
-        <p:spPr>
-          <a:xfrm>
-            <a:off x="5239440" y="1600200"/>
-            <a:ext cx="596900" cy="596900"/>
-          </a:xfrm>
-          <a:prstGeom prst="rect">
-            <a:avLst/>
-          </a:prstGeom>
-        </p:spPr>
-      </p:pic>
       <p:pic>
         <p:nvPicPr>
           <p:cNvPr id="7" name="Picture 6"/>
@@ -16187,6 +16157,309 @@
               <a:t>Displays all the jobs which are running on hoffman2</a:t>
             </a:r>
             <a:endParaRPr lang="en-US" dirty="0"/>
+          </a:p>
+        </p:txBody>
+      </p:sp>
+      <p:sp>
+        <p:nvSpPr>
+          <p:cNvPr id="18" name="Rectangle 17"/>
+          <p:cNvSpPr/>
+          <p:nvPr/>
+        </p:nvSpPr>
+        <p:spPr>
+          <a:xfrm>
+            <a:off x="385232" y="1634005"/>
+            <a:ext cx="5571067" cy="1200329"/>
+          </a:xfrm>
+          <a:prstGeom prst="rect">
+            <a:avLst/>
+          </a:prstGeom>
+        </p:spPr>
+        <p:txBody>
+          <a:bodyPr wrap="square">
+            <a:spAutoFit/>
+          </a:bodyPr>
+          <a:lstStyle/>
+          <a:p>
+            <a:r>
+              <a:rPr lang="en-US" dirty="0"/>
+              <a:t>. /</a:t>
+            </a:r>
+            <a:r>
+              <a:rPr lang="en-US" dirty="0" smtClean="0"/>
+              <a:t>u/local/Modules/default/</a:t>
+            </a:r>
+            <a:r>
+              <a:rPr lang="en-US" dirty="0" err="1" smtClean="0"/>
+              <a:t>init</a:t>
+            </a:r>
+            <a:r>
+              <a:rPr lang="en-US" dirty="0" smtClean="0"/>
+              <a:t>/</a:t>
+            </a:r>
+            <a:r>
+              <a:rPr lang="en-US" dirty="0" err="1" smtClean="0"/>
+              <a:t>modules.sh</a:t>
+            </a:r>
+            <a:endParaRPr lang="en-US" dirty="0" smtClean="0"/>
+          </a:p>
+          <a:p>
+            <a:r>
+              <a:rPr lang="en-US" dirty="0" smtClean="0"/>
+              <a:t>Module load </a:t>
+            </a:r>
+            <a:r>
+              <a:rPr lang="en-US" dirty="0" err="1" smtClean="0"/>
+              <a:t>bwa</a:t>
+            </a:r>
+            <a:endParaRPr lang="en-US" dirty="0" smtClean="0"/>
+          </a:p>
+          <a:p>
+            <a:r>
+              <a:rPr lang="en-US" dirty="0" err="1"/>
+              <a:t>b</a:t>
+            </a:r>
+            <a:r>
+              <a:rPr lang="en-US" dirty="0" err="1" smtClean="0"/>
+              <a:t>wa</a:t>
+            </a:r>
+            <a:r>
+              <a:rPr lang="en-US" dirty="0" smtClean="0"/>
+              <a:t> mem </a:t>
+            </a:r>
+            <a:r>
+              <a:rPr lang="en-US" dirty="0" err="1" smtClean="0"/>
+              <a:t>toy.ref.fastq</a:t>
+            </a:r>
+            <a:r>
+              <a:rPr lang="en-US" dirty="0" smtClean="0"/>
+              <a:t> </a:t>
+            </a:r>
+            <a:r>
+              <a:rPr lang="en-US" dirty="0" err="1" smtClean="0"/>
+              <a:t>toy.reads.fastq</a:t>
+            </a:r>
+            <a:r>
+              <a:rPr lang="en-US" dirty="0" smtClean="0"/>
+              <a:t>&gt;</a:t>
+            </a:r>
+            <a:r>
+              <a:rPr lang="en-US" dirty="0" err="1" smtClean="0"/>
+              <a:t>toy.reads.bwa.sam</a:t>
+            </a:r>
+            <a:r>
+              <a:rPr lang="en-US" dirty="0"/>
+              <a:t/>
+            </a:r>
+            <a:br>
+              <a:rPr lang="en-US" dirty="0"/>
+            </a:br>
+            <a:endParaRPr lang="en-US" dirty="0"/>
+          </a:p>
+        </p:txBody>
+      </p:sp>
+      <p:sp>
+        <p:nvSpPr>
+          <p:cNvPr id="19" name="Rectangle 18"/>
+          <p:cNvSpPr/>
+          <p:nvPr/>
+        </p:nvSpPr>
+        <p:spPr>
+          <a:xfrm>
+            <a:off x="6108700" y="1713525"/>
+            <a:ext cx="1738953" cy="523220"/>
+          </a:xfrm>
+          <a:prstGeom prst="rect">
+            <a:avLst/>
+          </a:prstGeom>
+        </p:spPr>
+        <p:txBody>
+          <a:bodyPr wrap="none">
+            <a:spAutoFit/>
+          </a:bodyPr>
+          <a:lstStyle/>
+          <a:p>
+            <a:r>
+              <a:rPr lang="en-US" sz="2800" dirty="0">
+                <a:latin typeface="+mj-lt"/>
+                <a:cs typeface="Courier New"/>
+              </a:rPr>
+              <a:t>vi </a:t>
+            </a:r>
+            <a:r>
+              <a:rPr lang="en-US" sz="2800" dirty="0" err="1">
+                <a:latin typeface="+mj-lt"/>
+                <a:cs typeface="Courier New"/>
+              </a:rPr>
+              <a:t>script.sh</a:t>
+            </a:r>
+            <a:endParaRPr lang="en-US" sz="2800" dirty="0">
+              <a:latin typeface="+mj-lt"/>
+              <a:cs typeface="Courier New"/>
+            </a:endParaRPr>
+          </a:p>
+        </p:txBody>
+      </p:sp>
+      <p:pic>
+        <p:nvPicPr>
+          <p:cNvPr id="20" name="Picture 19"/>
+          <p:cNvPicPr>
+            <a:picLocks noChangeAspect="1"/>
+          </p:cNvPicPr>
+          <p:nvPr/>
+        </p:nvPicPr>
+        <p:blipFill>
+          <a:blip r:embed="rId4"/>
+          <a:stretch>
+            <a:fillRect/>
+          </a:stretch>
+        </p:blipFill>
+        <p:spPr>
+          <a:xfrm>
+            <a:off x="7898453" y="1523025"/>
+            <a:ext cx="609600" cy="715617"/>
+          </a:xfrm>
+          <a:prstGeom prst="rect">
+            <a:avLst/>
+          </a:prstGeom>
+        </p:spPr>
+      </p:pic>
+      <p:sp>
+        <p:nvSpPr>
+          <p:cNvPr id="21" name="Rectangle 20"/>
+          <p:cNvSpPr/>
+          <p:nvPr/>
+        </p:nvSpPr>
+        <p:spPr>
+          <a:xfrm>
+            <a:off x="268343" y="1513339"/>
+            <a:ext cx="5586357" cy="1305163"/>
+          </a:xfrm>
+          <a:prstGeom prst="rect">
+            <a:avLst/>
+          </a:prstGeom>
+          <a:noFill/>
+        </p:spPr>
+        <p:style>
+          <a:lnRef idx="1">
+            <a:schemeClr val="dk1"/>
+          </a:lnRef>
+          <a:fillRef idx="3">
+            <a:schemeClr val="dk1"/>
+          </a:fillRef>
+          <a:effectRef idx="2">
+            <a:schemeClr val="dk1"/>
+          </a:effectRef>
+          <a:fontRef idx="minor">
+            <a:schemeClr val="lt1"/>
+          </a:fontRef>
+        </p:style>
+        <p:txBody>
+          <a:bodyPr rtlCol="0" anchor="ctr"/>
+          <a:lstStyle/>
+          <a:p>
+            <a:pPr algn="ctr"/>
+            <a:endParaRPr lang="en-US" sz="1600"/>
+          </a:p>
+        </p:txBody>
+      </p:sp>
+      <p:cxnSp>
+        <p:nvCxnSpPr>
+          <p:cNvPr id="23" name="Straight Arrow Connector 22"/>
+          <p:cNvCxnSpPr/>
+          <p:nvPr/>
+        </p:nvCxnSpPr>
+        <p:spPr>
+          <a:xfrm flipH="1" flipV="1">
+            <a:off x="5727700" y="1863566"/>
+            <a:ext cx="381000" cy="32647"/>
+          </a:xfrm>
+          <a:prstGeom prst="straightConnector1">
+            <a:avLst/>
+          </a:prstGeom>
+          <a:ln>
+            <a:tailEnd type="triangle"/>
+          </a:ln>
+        </p:spPr>
+        <p:style>
+          <a:lnRef idx="2">
+            <a:schemeClr val="accent1"/>
+          </a:lnRef>
+          <a:fillRef idx="0">
+            <a:schemeClr val="accent1"/>
+          </a:fillRef>
+          <a:effectRef idx="1">
+            <a:schemeClr val="accent1"/>
+          </a:effectRef>
+          <a:fontRef idx="minor">
+            <a:schemeClr val="tx1"/>
+          </a:fontRef>
+        </p:style>
+      </p:cxnSp>
+      <p:sp>
+        <p:nvSpPr>
+          <p:cNvPr id="25" name="Rectangle 24"/>
+          <p:cNvSpPr/>
+          <p:nvPr/>
+        </p:nvSpPr>
+        <p:spPr>
+          <a:xfrm>
+            <a:off x="4350268" y="4513265"/>
+            <a:ext cx="4572000" cy="1323439"/>
+          </a:xfrm>
+          <a:prstGeom prst="rect">
+            <a:avLst/>
+          </a:prstGeom>
+          <a:ln/>
+        </p:spPr>
+        <p:style>
+          <a:lnRef idx="2">
+            <a:schemeClr val="accent1">
+              <a:shade val="50000"/>
+            </a:schemeClr>
+          </a:lnRef>
+          <a:fillRef idx="1">
+            <a:schemeClr val="accent1"/>
+          </a:fillRef>
+          <a:effectRef idx="0">
+            <a:schemeClr val="accent1"/>
+          </a:effectRef>
+          <a:fontRef idx="minor">
+            <a:schemeClr val="lt1"/>
+          </a:fontRef>
+        </p:style>
+        <p:txBody>
+          <a:bodyPr>
+            <a:spAutoFit/>
+          </a:bodyPr>
+          <a:lstStyle/>
+          <a:p>
+            <a:r>
+              <a:rPr lang="en-US" sz="1600" dirty="0" err="1" smtClean="0">
+                <a:latin typeface="+mj-lt"/>
+              </a:rPr>
+              <a:t>toy.reads.bwa.sam</a:t>
+            </a:r>
+            <a:r>
+              <a:rPr lang="en-US" sz="1600" dirty="0" smtClean="0">
+                <a:latin typeface="+mj-lt"/>
+              </a:rPr>
+              <a:t>:</a:t>
+            </a:r>
+          </a:p>
+          <a:p>
+            <a:r>
+              <a:rPr lang="en-US" sz="1600" dirty="0" smtClean="0">
+                <a:latin typeface="+mj-lt"/>
+              </a:rPr>
+              <a:t>r1</a:t>
+            </a:r>
+            <a:r>
+              <a:rPr lang="en-US" sz="1600" dirty="0">
+                <a:latin typeface="+mj-lt"/>
+              </a:rPr>
+              <a:t>	0	ref	9	60	30M	*	0	0	ACTGGGGGACTGGGGGTTTTTTTGGACTGG	~~~~~~~~~~~~~~~~~~~~~~~~~~~~~~	NM:i:0	MD:Z:30	AS:i:30XS:i:0</a:t>
+            </a:r>
           </a:p>
         </p:txBody>
       </p:sp>
@@ -17554,190 +17827,6 @@
 </file>
 
 <file path=ppt/slides/slide33.xml><?xml version="1.0" encoding="utf-8"?>
-<p:sld xmlns:a="http://schemas.openxmlformats.org/drawingml/2006/main" xmlns:r="http://schemas.openxmlformats.org/officeDocument/2006/relationships" xmlns:p="http://schemas.openxmlformats.org/presentationml/2006/main">
-  <p:cSld>
-    <p:spTree>
-      <p:nvGrpSpPr>
-        <p:cNvPr id="1" name=""/>
-        <p:cNvGrpSpPr/>
-        <p:nvPr/>
-      </p:nvGrpSpPr>
-      <p:grpSpPr>
-        <a:xfrm>
-          <a:off x="0" y="0"/>
-          <a:ext cx="0" cy="0"/>
-          <a:chOff x="0" y="0"/>
-          <a:chExt cx="0" cy="0"/>
-        </a:xfrm>
-      </p:grpSpPr>
-      <p:sp>
-        <p:nvSpPr>
-          <p:cNvPr id="2" name="Title 1"/>
-          <p:cNvSpPr>
-            <a:spLocks noGrp="1"/>
-          </p:cNvSpPr>
-          <p:nvPr>
-            <p:ph type="title"/>
-          </p:nvPr>
-        </p:nvSpPr>
-        <p:spPr/>
-        <p:txBody>
-          <a:bodyPr>
-            <a:normAutofit fontScale="90000"/>
-          </a:bodyPr>
-          <a:lstStyle/>
-          <a:p>
-            <a:r>
-              <a:rPr lang="en-US" dirty="0" smtClean="0"/>
-              <a:t>QCB Bioinformatics </a:t>
-            </a:r>
-            <a:r>
-              <a:rPr lang="en-US" dirty="0"/>
-              <a:t>Core</a:t>
-            </a:r>
-            <a:br>
-              <a:rPr lang="en-US" dirty="0"/>
-            </a:br>
-            <a:endParaRPr lang="en-US" dirty="0"/>
-          </a:p>
-        </p:txBody>
-      </p:sp>
-      <p:sp>
-        <p:nvSpPr>
-          <p:cNvPr id="3" name="Content Placeholder 2"/>
-          <p:cNvSpPr>
-            <a:spLocks noGrp="1"/>
-          </p:cNvSpPr>
-          <p:nvPr>
-            <p:ph idx="1"/>
-          </p:nvPr>
-        </p:nvSpPr>
-        <p:spPr>
-          <a:xfrm>
-            <a:off x="457200" y="1227667"/>
-            <a:ext cx="8229600" cy="4525963"/>
-          </a:xfrm>
-        </p:spPr>
-        <p:txBody>
-          <a:bodyPr/>
-          <a:lstStyle/>
-          <a:p>
-            <a:pPr marL="342900" lvl="1" indent="-342900">
-              <a:buFont typeface="Arial"/>
-              <a:buChar char="•"/>
-            </a:pPr>
-            <a:r>
-              <a:rPr lang="en-US" dirty="0"/>
-              <a:t>offers next-generation sequencing data processing and analysis service (pilot stage</a:t>
-            </a:r>
-            <a:r>
-              <a:rPr lang="en-US" dirty="0" smtClean="0"/>
-              <a:t>)</a:t>
-            </a:r>
-          </a:p>
-          <a:p>
-            <a:pPr marL="742950" lvl="2" indent="-342900"/>
-            <a:r>
-              <a:rPr lang="en-US" dirty="0"/>
-              <a:t>RNA-</a:t>
-            </a:r>
-            <a:r>
-              <a:rPr lang="en-US" dirty="0" err="1" smtClean="0"/>
-              <a:t>Seq</a:t>
-            </a:r>
-            <a:endParaRPr lang="en-US" dirty="0"/>
-          </a:p>
-          <a:p>
-            <a:endParaRPr lang="en-US" dirty="0"/>
-          </a:p>
-        </p:txBody>
-      </p:sp>
-      <p:pic>
-        <p:nvPicPr>
-          <p:cNvPr id="4" name="Picture 3"/>
-          <p:cNvPicPr>
-            <a:picLocks noChangeAspect="1"/>
-          </p:cNvPicPr>
-          <p:nvPr/>
-        </p:nvPicPr>
-        <p:blipFill>
-          <a:blip r:embed="rId2"/>
-          <a:stretch>
-            <a:fillRect/>
-          </a:stretch>
-        </p:blipFill>
-        <p:spPr>
-          <a:xfrm>
-            <a:off x="1185334" y="2827867"/>
-            <a:ext cx="6723151" cy="3415230"/>
-          </a:xfrm>
-          <a:prstGeom prst="rect">
-            <a:avLst/>
-          </a:prstGeom>
-        </p:spPr>
-      </p:pic>
-      <p:sp>
-        <p:nvSpPr>
-          <p:cNvPr id="6" name="Rectangle 5"/>
-          <p:cNvSpPr/>
-          <p:nvPr/>
-        </p:nvSpPr>
-        <p:spPr>
-          <a:xfrm>
-            <a:off x="2287911" y="6310829"/>
-            <a:ext cx="4314177" cy="369332"/>
-          </a:xfrm>
-          <a:prstGeom prst="rect">
-            <a:avLst/>
-          </a:prstGeom>
-        </p:spPr>
-        <p:txBody>
-          <a:bodyPr wrap="none">
-            <a:spAutoFit/>
-          </a:bodyPr>
-          <a:lstStyle/>
-          <a:p>
-            <a:r>
-              <a:rPr lang="en-US" dirty="0">
-                <a:hlinkClick r:id="rId3"/>
-              </a:rPr>
-              <a:t>http://qcb.ucla.edu/collaboratory/services</a:t>
-            </a:r>
-            <a:r>
-              <a:rPr lang="en-US" dirty="0" smtClean="0">
-                <a:hlinkClick r:id="rId3"/>
-              </a:rPr>
-              <a:t>/</a:t>
-            </a:r>
-            <a:r>
-              <a:rPr lang="en-US" dirty="0" smtClean="0"/>
-              <a:t> </a:t>
-            </a:r>
-            <a:endParaRPr lang="en-US" dirty="0"/>
-          </a:p>
-        </p:txBody>
-      </p:sp>
-    </p:spTree>
-    <p:extLst>
-      <p:ext uri="{BB962C8B-B14F-4D97-AF65-F5344CB8AC3E}">
-        <p14:creationId xmlns:p14="http://schemas.microsoft.com/office/powerpoint/2010/main" val="922800172"/>
-      </p:ext>
-    </p:extLst>
-  </p:cSld>
-  <p:clrMapOvr>
-    <a:masterClrMapping/>
-  </p:clrMapOvr>
-  <p:timing>
-    <p:tnLst>
-      <p:par>
-        <p:cTn id="1" dur="indefinite" restart="never" nodeType="tmRoot"/>
-      </p:par>
-    </p:tnLst>
-  </p:timing>
-</p:sld>
-</file>
-
-<file path=ppt/slides/slide34.xml><?xml version="1.0" encoding="utf-8"?>
 <p:sld xmlns:a="http://schemas.openxmlformats.org/drawingml/2006/main" xmlns:r="http://schemas.openxmlformats.org/officeDocument/2006/relationships" xmlns:p="http://schemas.openxmlformats.org/presentationml/2006/main">
   <p:cSld>
     <p:spTree>
@@ -18934,7 +19023,7 @@
 </p:sld>
 </file>
 
-<file path=ppt/slides/slide35.xml><?xml version="1.0" encoding="utf-8"?>
+<file path=ppt/slides/slide34.xml><?xml version="1.0" encoding="utf-8"?>
 <p:sld xmlns:a="http://schemas.openxmlformats.org/drawingml/2006/main" xmlns:r="http://schemas.openxmlformats.org/officeDocument/2006/relationships" xmlns:p="http://schemas.openxmlformats.org/presentationml/2006/main">
   <p:cSld>
     <p:spTree>
@@ -19883,11 +19972,18 @@
               <a:buNone/>
             </a:pPr>
             <a:r>
+              <a:rPr lang="en-US" sz="2800" dirty="0" smtClean="0">
+                <a:latin typeface="Courier New"/>
+                <a:cs typeface="Courier New"/>
+              </a:rPr>
+              <a:t>if(age&gt;21) </a:t>
+            </a:r>
+            <a:r>
               <a:rPr lang="en-US" sz="2800" dirty="0">
                 <a:latin typeface="Courier New"/>
                 <a:cs typeface="Courier New"/>
               </a:rPr>
-              <a:t>if(age&gt;18) then</a:t>
+              <a:t>then</a:t>
             </a:r>
           </a:p>
           <a:p>
@@ -20042,22 +20138,13 @@
               <a:p>
                 <a:pPr algn="ctr"/>
                 <a:r>
-                  <a:rPr lang="en-US" sz="1600" dirty="0">
-                    <a:solidFill>
-                      <a:srgbClr val="000000"/>
-                    </a:solidFill>
-                    <a:latin typeface="+mj-lt"/>
-                  </a:rPr>
-                  <a:t>a</a:t>
-                </a:r>
-                <a:r>
                   <a:rPr lang="en-US" sz="1600" dirty="0" smtClean="0">
                     <a:solidFill>
                       <a:srgbClr val="000000"/>
                     </a:solidFill>
                     <a:latin typeface="+mj-lt"/>
                   </a:rPr>
-                  <a:t>ge&gt;18</a:t>
+                  <a:t>age&gt;21</a:t>
                 </a:r>
                 <a:endParaRPr lang="en-US" sz="1600" dirty="0">
                   <a:solidFill>

</xml_diff>